<commit_message>
all slides types working
</commit_message>
<xml_diff>
--- a/python-pptx/testjson2.pptx
+++ b/python-pptx/testjson2.pptx
@@ -13,7 +13,6 @@
     <p:sldId id="261" r:id="rId12"/>
     <p:sldId id="262" r:id="rId13"/>
     <p:sldId id="263" r:id="rId14"/>
-    <p:sldId id="264" r:id="rId15"/>
   </p:sldIdLst>
   <p:sldSz cx="9144000" cy="6858000" type="screen4x3"/>
   <p:notesSz cx="6858000" cy="9144000"/>
@@ -3103,54 +3102,37 @@
             <a:spLocks noGrp="1"/>
           </p:cNvSpPr>
           <p:nvPr>
-            <p:ph type="title"/>
-          </p:nvPr>
-        </p:nvSpPr>
-        <p:spPr/>
-        <p:txBody>
-          <a:bodyPr/>
-          <a:lstStyle/>
-          <a:p>
-            <a:r>
-              <a:t>Slide with a content and caption</a:t>
-            </a:r>
-          </a:p>
-        </p:txBody>
-      </p:sp>
-      <p:sp>
-        <p:nvSpPr>
-          <p:cNvPr id="3" name="Content Placeholder 2"/>
-          <p:cNvSpPr>
-            <a:spLocks noGrp="1"/>
-          </p:cNvSpPr>
-          <p:nvPr>
-            <p:ph idx="1"/>
-          </p:nvPr>
-        </p:nvSpPr>
-        <p:spPr/>
-        <p:txBody>
-          <a:bodyPr/>
-          <a:lstStyle/>
-          <a:p/>
-        </p:txBody>
-      </p:sp>
-      <p:sp>
-        <p:nvSpPr>
-          <p:cNvPr id="4" name="Text Placeholder 3"/>
-          <p:cNvSpPr>
-            <a:spLocks noGrp="1"/>
-          </p:cNvSpPr>
-          <p:nvPr>
-            <p:ph type="body" idx="2" sz="half"/>
-          </p:nvPr>
-        </p:nvSpPr>
-        <p:spPr/>
-        <p:txBody>
-          <a:bodyPr/>
-          <a:lstStyle/>
-          <a:p>
-            <a:r>
-              <a:t>caption text</a:t>
+            <p:ph type="ctrTitle"/>
+          </p:nvPr>
+        </p:nvSpPr>
+        <p:spPr/>
+        <p:txBody>
+          <a:bodyPr/>
+          <a:lstStyle/>
+          <a:p>
+            <a:r>
+              <a:t>Document title</a:t>
+            </a:r>
+          </a:p>
+        </p:txBody>
+      </p:sp>
+      <p:sp>
+        <p:nvSpPr>
+          <p:cNvPr id="3" name="Subtitle 2"/>
+          <p:cNvSpPr>
+            <a:spLocks noGrp="1"/>
+          </p:cNvSpPr>
+          <p:nvPr>
+            <p:ph type="subTitle" idx="1"/>
+          </p:nvPr>
+        </p:nvSpPr>
+        <p:spPr/>
+        <p:txBody>
+          <a:bodyPr/>
+          <a:lstStyle/>
+          <a:p>
+            <a:r>
+              <a:t>Lorem ipsum dolor sit amet, consectetur adipiscing elit. Fusce diam ipsum, aliquam sit amet tempor sed, sodales vitae tellus. Fusce vitae lobortis quam. Proin laoreet efficitur ligula, laoreet congue neque condimentum a</a:t>
             </a:r>
           </a:p>
         </p:txBody>
@@ -3180,37 +3162,37 @@
             <a:spLocks noGrp="1"/>
           </p:cNvSpPr>
           <p:nvPr>
-            <p:ph type="ctrTitle"/>
-          </p:nvPr>
-        </p:nvSpPr>
-        <p:spPr/>
-        <p:txBody>
-          <a:bodyPr/>
-          <a:lstStyle/>
-          <a:p>
-            <a:r>
-              <a:t>Document title</a:t>
-            </a:r>
-          </a:p>
-        </p:txBody>
-      </p:sp>
-      <p:sp>
-        <p:nvSpPr>
-          <p:cNvPr id="3" name="Subtitle 2"/>
-          <p:cNvSpPr>
-            <a:spLocks noGrp="1"/>
-          </p:cNvSpPr>
-          <p:nvPr>
-            <p:ph type="subTitle" idx="1"/>
-          </p:nvPr>
-        </p:nvSpPr>
-        <p:spPr/>
-        <p:txBody>
-          <a:bodyPr/>
-          <a:lstStyle/>
-          <a:p>
-            <a:r>
-              <a:t>Lorem ipsum dolor sit amet, consectetur adipiscing elit. Fusce diam ipsum, aliquam sit amet tempor sed, sodales vitae tellus. Fusce vitae lobortis quam. Proin laoreet efficitur ligula, laoreet congue neque condimentum a</a:t>
+            <p:ph type="title"/>
+          </p:nvPr>
+        </p:nvSpPr>
+        <p:spPr/>
+        <p:txBody>
+          <a:bodyPr/>
+          <a:lstStyle/>
+          <a:p>
+            <a:r>
+              <a:t>Part 1</a:t>
+            </a:r>
+          </a:p>
+        </p:txBody>
+      </p:sp>
+      <p:sp>
+        <p:nvSpPr>
+          <p:cNvPr id="3" name="Text Placeholder 2"/>
+          <p:cNvSpPr>
+            <a:spLocks noGrp="1"/>
+          </p:cNvSpPr>
+          <p:nvPr>
+            <p:ph type="body" idx="1"/>
+          </p:nvPr>
+        </p:nvSpPr>
+        <p:spPr/>
+        <p:txBody>
+          <a:bodyPr/>
+          <a:lstStyle/>
+          <a:p>
+            <a:r>
+              <a:t>Lorem ipsum dolor sit amet, consectetur adipiscing elit. Fusce diam ipsum, aliquam sit amet tempor sed.</a:t>
             </a:r>
           </a:p>
         </p:txBody>
@@ -3249,28 +3231,49 @@
           <a:lstStyle/>
           <a:p>
             <a:r>
-              <a:t>Part 1</a:t>
-            </a:r>
-          </a:p>
-        </p:txBody>
-      </p:sp>
-      <p:sp>
-        <p:nvSpPr>
-          <p:cNvPr id="3" name="Text Placeholder 2"/>
-          <p:cNvSpPr>
-            <a:spLocks noGrp="1"/>
-          </p:cNvSpPr>
-          <p:nvPr>
-            <p:ph type="body" idx="1"/>
-          </p:nvPr>
-        </p:nvSpPr>
-        <p:spPr/>
-        <p:txBody>
-          <a:bodyPr/>
-          <a:lstStyle/>
-          <a:p>
-            <a:r>
-              <a:t>Lorem ipsum dolor sit amet, consectetur adipiscing elit. Fusce diam ipsum, aliquam sit amet tempor sed.</a:t>
+              <a:t>Part 1-1</a:t>
+            </a:r>
+          </a:p>
+        </p:txBody>
+      </p:sp>
+      <p:sp>
+        <p:nvSpPr>
+          <p:cNvPr id="3" name="Content Placeholder 2"/>
+          <p:cNvSpPr>
+            <a:spLocks noGrp="1"/>
+          </p:cNvSpPr>
+          <p:nvPr>
+            <p:ph idx="1" sz="half"/>
+          </p:nvPr>
+        </p:nvSpPr>
+        <p:spPr/>
+        <p:txBody>
+          <a:bodyPr/>
+          <a:lstStyle/>
+          <a:p>
+            <a:r>
+              <a:t>Lorem ipsum dolor sit amet, consectetur adipiscing elit. Fusce diam ipsum, aliquam sit amet tempor sed, sodales vitae tellus.</a:t>
+            </a:r>
+          </a:p>
+        </p:txBody>
+      </p:sp>
+      <p:sp>
+        <p:nvSpPr>
+          <p:cNvPr id="4" name="Content Placeholder 3"/>
+          <p:cNvSpPr>
+            <a:spLocks noGrp="1"/>
+          </p:cNvSpPr>
+          <p:nvPr>
+            <p:ph idx="2" sz="half"/>
+          </p:nvPr>
+        </p:nvSpPr>
+        <p:spPr/>
+        <p:txBody>
+          <a:bodyPr/>
+          <a:lstStyle/>
+          <a:p>
+            <a:r>
+              <a:t>Nulla odio nibh, aliquam sit amet eros a, vehicula eleifend tortor. Sed interdum tellus eu convallis pretium. Proin euismod felis id tortor semper, vel vehicula quam dapibus.</a:t>
             </a:r>
           </a:p>
         </p:txBody>
@@ -3309,7 +3312,7 @@
           <a:lstStyle/>
           <a:p>
             <a:r>
-              <a:t>Part 1-1</a:t>
+              <a:t>Part 1-2</a:t>
             </a:r>
           </a:p>
         </p:txBody>
@@ -3321,7 +3324,7 @@
             <a:spLocks noGrp="1"/>
           </p:cNvSpPr>
           <p:nvPr>
-            <p:ph idx="1"/>
+            <p:ph idx="1" sz="half"/>
           </p:nvPr>
         </p:nvSpPr>
         <p:spPr/>
@@ -3333,9 +3336,25 @@
               <a:t>Lorem ipsum dolor sit amet, consectetur adipiscing elit. Fusce diam ipsum, aliquam sit amet tempor sed, sodales vitae tellus.</a:t>
             </a:r>
           </a:p>
-          <a:p>
-            <a:r>
-              <a:t>Nulla odio nibh, aliquam sit amet eros a, vehicula eleifend tortor. Sed interdum tellus eu convallis pretium. Proin euismod felis id tortor semper, vel vehicula quam dapibus.</a:t>
+        </p:txBody>
+      </p:sp>
+      <p:sp>
+        <p:nvSpPr>
+          <p:cNvPr id="4" name="Content Placeholder 3"/>
+          <p:cNvSpPr>
+            <a:spLocks noGrp="1"/>
+          </p:cNvSpPr>
+          <p:nvPr>
+            <p:ph idx="2" sz="half"/>
+          </p:nvPr>
+        </p:nvSpPr>
+        <p:spPr/>
+        <p:txBody>
+          <a:bodyPr/>
+          <a:lstStyle/>
+          <a:p>
+            <a:r>
+              <a:t>Nulla odio nibh, aliquam sit amet eros a, vehicula eleifend tortor.</a:t>
             </a:r>
           </a:p>
         </p:txBody>
@@ -3374,35 +3393,26 @@
           <a:lstStyle/>
           <a:p>
             <a:r>
-              <a:t>Part 1-2</a:t>
-            </a:r>
-          </a:p>
-        </p:txBody>
-      </p:sp>
-      <p:sp>
-        <p:nvSpPr>
-          <p:cNvPr id="3" name="Content Placeholder 2"/>
-          <p:cNvSpPr>
-            <a:spLocks noGrp="1"/>
-          </p:cNvSpPr>
-          <p:nvPr>
-            <p:ph idx="1"/>
-          </p:nvPr>
-        </p:nvSpPr>
-        <p:spPr/>
-        <p:txBody>
-          <a:bodyPr/>
-          <a:lstStyle/>
-          <a:p>
-            <a:r>
-              <a:t>Lorem ipsum dolor sit amet, consectetur adipiscing elit. Fusce diam ipsum, aliquam sit amet tempor sed, sodales vitae tellus.</a:t>
-            </a:r>
-          </a:p>
-          <a:p>
-            <a:r>
-              <a:t>Nulla odio nibh, aliquam sit amet eros a, vehicula eleifend tortor.</a:t>
-            </a:r>
-          </a:p>
+              <a:t>Part 2</a:t>
+            </a:r>
+          </a:p>
+        </p:txBody>
+      </p:sp>
+      <p:sp>
+        <p:nvSpPr>
+          <p:cNvPr id="3" name="Text Placeholder 2"/>
+          <p:cNvSpPr>
+            <a:spLocks noGrp="1"/>
+          </p:cNvSpPr>
+          <p:nvPr>
+            <p:ph type="body" idx="1"/>
+          </p:nvPr>
+        </p:nvSpPr>
+        <p:spPr/>
+        <p:txBody>
+          <a:bodyPr/>
+          <a:lstStyle/>
+          <a:p/>
         </p:txBody>
       </p:sp>
     </p:spTree>
@@ -3439,26 +3449,30 @@
           <a:lstStyle/>
           <a:p>
             <a:r>
-              <a:t>Part 2</a:t>
-            </a:r>
-          </a:p>
-        </p:txBody>
-      </p:sp>
-      <p:sp>
-        <p:nvSpPr>
-          <p:cNvPr id="3" name="Text Placeholder 2"/>
-          <p:cNvSpPr>
-            <a:spLocks noGrp="1"/>
-          </p:cNvSpPr>
-          <p:nvPr>
-            <p:ph type="body" idx="1"/>
-          </p:nvPr>
-        </p:nvSpPr>
-        <p:spPr/>
-        <p:txBody>
-          <a:bodyPr/>
-          <a:lstStyle/>
-          <a:p/>
+              <a:t>Part 2-1</a:t>
+            </a:r>
+          </a:p>
+        </p:txBody>
+      </p:sp>
+      <p:sp>
+        <p:nvSpPr>
+          <p:cNvPr id="3" name="Content Placeholder 2"/>
+          <p:cNvSpPr>
+            <a:spLocks noGrp="1"/>
+          </p:cNvSpPr>
+          <p:nvPr>
+            <p:ph idx="1"/>
+          </p:nvPr>
+        </p:nvSpPr>
+        <p:spPr/>
+        <p:txBody>
+          <a:bodyPr/>
+          <a:lstStyle/>
+          <a:p>
+            <a:r>
+              <a:t>Lorem ipsum dolor sit amet, consectetur adipiscing elit. Fusce diam ipsum, aliquam sit amet tempor sed, sodales vitae tellus.</a:t>
+            </a:r>
+          </a:p>
         </p:txBody>
       </p:sp>
     </p:spTree>
@@ -3495,7 +3509,7 @@
           <a:lstStyle/>
           <a:p>
             <a:r>
-              <a:t>Part 2-1</a:t>
+              <a:t>Part 2-2</a:t>
             </a:r>
           </a:p>
         </p:txBody>
@@ -3516,7 +3530,7 @@
           <a:lstStyle/>
           <a:p>
             <a:r>
-              <a:t>Lorem ipsum dolor sit amet, consectetur adipiscing elit. Fusce diam ipsum, aliquam sit amet tempor sed, sodales vitae tellus.</a:t>
+              <a:t>Lorem ipsum dolor sit amet, consectetur adipiscing elit. Fusce diam ipsum, aliquam sit amet tempor sed, sodales vitae tellus. Nulla odio nibh, aliquam sit amet eros a, vehicula eleifend tortor.</a:t>
             </a:r>
           </a:p>
         </p:txBody>
@@ -3555,7 +3569,7 @@
           <a:lstStyle/>
           <a:p>
             <a:r>
-              <a:t>Part 2-2</a:t>
+              <a:t>Part 2-2-1</a:t>
             </a:r>
           </a:p>
         </p:txBody>
@@ -3567,67 +3581,7 @@
             <a:spLocks noGrp="1"/>
           </p:cNvSpPr>
           <p:nvPr>
-            <p:ph idx="1"/>
-          </p:nvPr>
-        </p:nvSpPr>
-        <p:spPr/>
-        <p:txBody>
-          <a:bodyPr/>
-          <a:lstStyle/>
-          <a:p>
-            <a:r>
-              <a:t>Lorem ipsum dolor sit amet, consectetur adipiscing elit. Fusce diam ipsum, aliquam sit amet tempor sed, sodales vitae tellus. Nulla odio nibh, aliquam sit amet eros a, vehicula eleifend tortor.</a:t>
-            </a:r>
-          </a:p>
-        </p:txBody>
-      </p:sp>
-    </p:spTree>
-  </p:cSld>
-  <p:clrMapOvr>
-    <a:masterClrMapping/>
-  </p:clrMapOvr>
-</p:sld>
-</file>
-
-<file path=ppt/slides/slide9.xml><?xml version="1.0" encoding="utf-8"?>
-<p:sld xmlns:a="http://schemas.openxmlformats.org/drawingml/2006/main" xmlns:p="http://schemas.openxmlformats.org/presentationml/2006/main" xmlns:r="http://schemas.openxmlformats.org/officeDocument/2006/relationships">
-  <p:cSld>
-    <p:spTree>
-      <p:nvGrpSpPr>
-        <p:cNvPr id="1" name=""/>
-        <p:cNvGrpSpPr/>
-        <p:nvPr/>
-      </p:nvGrpSpPr>
-      <p:grpSpPr/>
-      <p:sp>
-        <p:nvSpPr>
-          <p:cNvPr id="2" name="Title 1"/>
-          <p:cNvSpPr>
-            <a:spLocks noGrp="1"/>
-          </p:cNvSpPr>
-          <p:nvPr>
-            <p:ph type="title"/>
-          </p:nvPr>
-        </p:nvSpPr>
-        <p:spPr/>
-        <p:txBody>
-          <a:bodyPr/>
-          <a:lstStyle/>
-          <a:p>
-            <a:r>
-              <a:t>Part 2-2-1</a:t>
-            </a:r>
-          </a:p>
-        </p:txBody>
-      </p:sp>
-      <p:sp>
-        <p:nvSpPr>
-          <p:cNvPr id="3" name="Content Placeholder 2"/>
-          <p:cNvSpPr>
-            <a:spLocks noGrp="1"/>
-          </p:cNvSpPr>
-          <p:nvPr>
-            <p:ph idx="1"/>
+            <p:ph idx="1" sz="half"/>
           </p:nvPr>
         </p:nvSpPr>
         <p:spPr/>
@@ -3639,6 +3593,22 @@
               <a:t>Lorem ipsum dolor sit amet, consectetur adipiscing elit.</a:t>
             </a:r>
           </a:p>
+        </p:txBody>
+      </p:sp>
+      <p:sp>
+        <p:nvSpPr>
+          <p:cNvPr id="4" name="Content Placeholder 3"/>
+          <p:cNvSpPr>
+            <a:spLocks noGrp="1"/>
+          </p:cNvSpPr>
+          <p:nvPr>
+            <p:ph idx="2" sz="half"/>
+          </p:nvPr>
+        </p:nvSpPr>
+        <p:spPr/>
+        <p:txBody>
+          <a:bodyPr/>
+          <a:lstStyle/>
           <a:p>
             <a:r>
               <a:t>Deuxieme texte</a:t>

</xml_diff>

<commit_message>
moved json to data folder, test with image crawler, slide layouts done
</commit_message>
<xml_diff>
--- a/python-pptx/testjson2.pptx
+++ b/python-pptx/testjson2.pptx
@@ -13,6 +13,10 @@
     <p:sldId id="261" r:id="rId12"/>
     <p:sldId id="262" r:id="rId13"/>
     <p:sldId id="263" r:id="rId14"/>
+    <p:sldId id="264" r:id="rId15"/>
+    <p:sldId id="265" r:id="rId16"/>
+    <p:sldId id="266" r:id="rId17"/>
+    <p:sldId id="267" r:id="rId18"/>
   </p:sldIdLst>
   <p:sldSz cx="9144000" cy="6858000" type="screen4x3"/>
   <p:notesSz cx="6858000" cy="9144000"/>
@@ -3102,37 +3106,261 @@
             <a:spLocks noGrp="1"/>
           </p:cNvSpPr>
           <p:nvPr>
-            <p:ph type="ctrTitle"/>
-          </p:nvPr>
-        </p:nvSpPr>
-        <p:spPr/>
-        <p:txBody>
-          <a:bodyPr/>
-          <a:lstStyle/>
-          <a:p>
-            <a:r>
-              <a:t>Document title</a:t>
-            </a:r>
-          </a:p>
-        </p:txBody>
-      </p:sp>
-      <p:sp>
-        <p:nvSpPr>
-          <p:cNvPr id="3" name="Subtitle 2"/>
-          <p:cNvSpPr>
-            <a:spLocks noGrp="1"/>
-          </p:cNvSpPr>
-          <p:nvPr>
-            <p:ph type="subTitle" idx="1"/>
-          </p:nvPr>
-        </p:nvSpPr>
-        <p:spPr/>
-        <p:txBody>
-          <a:bodyPr/>
-          <a:lstStyle/>
-          <a:p>
-            <a:r>
-              <a:t>Lorem ipsum dolor sit amet, consectetur adipiscing elit. Fusce diam ipsum, aliquam sit amet tempor sed, sodales vitae tellus. Fusce vitae lobortis quam. Proin laoreet efficitur ligula, laoreet congue neque condimentum a</a:t>
+            <p:ph type="title"/>
+          </p:nvPr>
+        </p:nvSpPr>
+        <p:spPr/>
+        <p:txBody>
+          <a:bodyPr/>
+          <a:lstStyle/>
+          <a:p>
+            <a:r>
+              <a:t>My super title</a:t>
+            </a:r>
+          </a:p>
+        </p:txBody>
+      </p:sp>
+      <p:sp>
+        <p:nvSpPr>
+          <p:cNvPr id="3" name="Content Placeholder 2"/>
+          <p:cNvSpPr>
+            <a:spLocks noGrp="1"/>
+          </p:cNvSpPr>
+          <p:nvPr>
+            <p:ph idx="1" sz="half"/>
+          </p:nvPr>
+        </p:nvSpPr>
+        <p:spPr/>
+        <p:txBody>
+          <a:bodyPr/>
+          <a:lstStyle/>
+          <a:p>
+            <a:r>
+              <a:t>My first text</a:t>
+            </a:r>
+          </a:p>
+          <a:p>
+            <a:r>
+              <a:t>My second text</a:t>
+            </a:r>
+          </a:p>
+        </p:txBody>
+      </p:sp>
+      <p:sp>
+        <p:nvSpPr>
+          <p:cNvPr id="4" name="Content Placeholder 3"/>
+          <p:cNvSpPr>
+            <a:spLocks noGrp="1"/>
+          </p:cNvSpPr>
+          <p:nvPr>
+            <p:ph idx="2" sz="half"/>
+          </p:nvPr>
+        </p:nvSpPr>
+        <p:spPr/>
+        <p:txBody>
+          <a:bodyPr/>
+          <a:lstStyle/>
+          <a:p>
+            <a:r>
+              <a:t>My third text</a:t>
+            </a:r>
+          </a:p>
+        </p:txBody>
+      </p:sp>
+    </p:spTree>
+  </p:cSld>
+  <p:clrMapOvr>
+    <a:masterClrMapping/>
+  </p:clrMapOvr>
+</p:sld>
+</file>
+
+<file path=ppt/slides/slide10.xml><?xml version="1.0" encoding="utf-8"?>
+<p:sld xmlns:a="http://schemas.openxmlformats.org/drawingml/2006/main" xmlns:p="http://schemas.openxmlformats.org/presentationml/2006/main" xmlns:r="http://schemas.openxmlformats.org/officeDocument/2006/relationships">
+  <p:cSld>
+    <p:spTree>
+      <p:nvGrpSpPr>
+        <p:cNvPr id="1" name=""/>
+        <p:cNvGrpSpPr/>
+        <p:nvPr/>
+      </p:nvGrpSpPr>
+      <p:grpSpPr/>
+      <p:sp>
+        <p:nvSpPr>
+          <p:cNvPr id="2" name="Title 1"/>
+          <p:cNvSpPr>
+            <a:spLocks noGrp="1"/>
+          </p:cNvSpPr>
+          <p:nvPr>
+            <p:ph type="title"/>
+          </p:nvPr>
+        </p:nvSpPr>
+        <p:spPr/>
+        <p:txBody>
+          <a:bodyPr/>
+          <a:lstStyle/>
+          <a:p>
+            <a:r>
+              <a:t>Part 2-2</a:t>
+            </a:r>
+          </a:p>
+        </p:txBody>
+      </p:sp>
+      <p:sp>
+        <p:nvSpPr>
+          <p:cNvPr id="3" name="Content Placeholder 2"/>
+          <p:cNvSpPr>
+            <a:spLocks noGrp="1"/>
+          </p:cNvSpPr>
+          <p:nvPr>
+            <p:ph idx="1"/>
+          </p:nvPr>
+        </p:nvSpPr>
+        <p:spPr/>
+        <p:txBody>
+          <a:bodyPr/>
+          <a:lstStyle/>
+          <a:p>
+            <a:r>
+              <a:t>Lorem ipsum dolor sit amet, consectetur adipiscing elit. Fusce diam ipsum, aliquam sit amet tempor sed, sodales vitae tellus. Nulla odio nibh, aliquam sit amet eros a, vehicula eleifend tortor.</a:t>
+            </a:r>
+          </a:p>
+        </p:txBody>
+      </p:sp>
+    </p:spTree>
+  </p:cSld>
+  <p:clrMapOvr>
+    <a:masterClrMapping/>
+  </p:clrMapOvr>
+</p:sld>
+</file>
+
+<file path=ppt/slides/slide11.xml><?xml version="1.0" encoding="utf-8"?>
+<p:sld xmlns:a="http://schemas.openxmlformats.org/drawingml/2006/main" xmlns:p="http://schemas.openxmlformats.org/presentationml/2006/main" xmlns:r="http://schemas.openxmlformats.org/officeDocument/2006/relationships">
+  <p:cSld>
+    <p:spTree>
+      <p:nvGrpSpPr>
+        <p:cNvPr id="1" name=""/>
+        <p:cNvGrpSpPr/>
+        <p:nvPr/>
+      </p:nvGrpSpPr>
+      <p:grpSpPr/>
+      <p:sp>
+        <p:nvSpPr>
+          <p:cNvPr id="2" name="Title 1"/>
+          <p:cNvSpPr>
+            <a:spLocks noGrp="1"/>
+          </p:cNvSpPr>
+          <p:nvPr>
+            <p:ph type="title"/>
+          </p:nvPr>
+        </p:nvSpPr>
+        <p:spPr/>
+        <p:txBody>
+          <a:bodyPr/>
+          <a:lstStyle/>
+          <a:p>
+            <a:r>
+              <a:t>Part 2-2-1</a:t>
+            </a:r>
+          </a:p>
+        </p:txBody>
+      </p:sp>
+      <p:sp>
+        <p:nvSpPr>
+          <p:cNvPr id="3" name="Content Placeholder 2"/>
+          <p:cNvSpPr>
+            <a:spLocks noGrp="1"/>
+          </p:cNvSpPr>
+          <p:nvPr>
+            <p:ph idx="1" sz="half"/>
+          </p:nvPr>
+        </p:nvSpPr>
+        <p:spPr/>
+        <p:txBody>
+          <a:bodyPr/>
+          <a:lstStyle/>
+          <a:p/>
+        </p:txBody>
+      </p:sp>
+      <p:sp>
+        <p:nvSpPr>
+          <p:cNvPr id="4" name="Content Placeholder 3"/>
+          <p:cNvSpPr>
+            <a:spLocks noGrp="1"/>
+          </p:cNvSpPr>
+          <p:nvPr>
+            <p:ph idx="2" sz="half"/>
+          </p:nvPr>
+        </p:nvSpPr>
+        <p:spPr/>
+        <p:txBody>
+          <a:bodyPr/>
+          <a:lstStyle/>
+          <a:p/>
+        </p:txBody>
+      </p:sp>
+    </p:spTree>
+  </p:cSld>
+  <p:clrMapOvr>
+    <a:masterClrMapping/>
+  </p:clrMapOvr>
+</p:sld>
+</file>
+
+<file path=ppt/slides/slide12.xml><?xml version="1.0" encoding="utf-8"?>
+<p:sld xmlns:a="http://schemas.openxmlformats.org/drawingml/2006/main" xmlns:p="http://schemas.openxmlformats.org/presentationml/2006/main" xmlns:r="http://schemas.openxmlformats.org/officeDocument/2006/relationships">
+  <p:cSld>
+    <p:spTree>
+      <p:nvGrpSpPr>
+        <p:cNvPr id="1" name=""/>
+        <p:cNvGrpSpPr/>
+        <p:nvPr/>
+      </p:nvGrpSpPr>
+      <p:grpSpPr/>
+      <p:sp>
+        <p:nvSpPr>
+          <p:cNvPr id="2" name="Title 1"/>
+          <p:cNvSpPr>
+            <a:spLocks noGrp="1"/>
+          </p:cNvSpPr>
+          <p:nvPr>
+            <p:ph type="title"/>
+          </p:nvPr>
+        </p:nvSpPr>
+        <p:spPr/>
+        <p:txBody>
+          <a:bodyPr/>
+          <a:lstStyle/>
+          <a:p>
+            <a:r>
+              <a:t>Part 2-2-1</a:t>
+            </a:r>
+          </a:p>
+        </p:txBody>
+      </p:sp>
+      <p:sp>
+        <p:nvSpPr>
+          <p:cNvPr id="3" name="Content Placeholder 2"/>
+          <p:cNvSpPr>
+            <a:spLocks noGrp="1"/>
+          </p:cNvSpPr>
+          <p:nvPr>
+            <p:ph idx="1"/>
+          </p:nvPr>
+        </p:nvSpPr>
+        <p:spPr/>
+        <p:txBody>
+          <a:bodyPr/>
+          <a:lstStyle/>
+          <a:p>
+            <a:r>
+              <a:t>Lorem ipsum dolor sit amet, consectetur adipiscing elit.</a:t>
+            </a:r>
+          </a:p>
+          <a:p>
+            <a:r>
+              <a:t>Deuxieme texte</a:t>
             </a:r>
           </a:p>
         </p:txBody>
@@ -3162,37 +3390,37 @@
             <a:spLocks noGrp="1"/>
           </p:cNvSpPr>
           <p:nvPr>
-            <p:ph type="title"/>
-          </p:nvPr>
-        </p:nvSpPr>
-        <p:spPr/>
-        <p:txBody>
-          <a:bodyPr/>
-          <a:lstStyle/>
-          <a:p>
-            <a:r>
-              <a:t>Part 1</a:t>
-            </a:r>
-          </a:p>
-        </p:txBody>
-      </p:sp>
-      <p:sp>
-        <p:nvSpPr>
-          <p:cNvPr id="3" name="Text Placeholder 2"/>
-          <p:cNvSpPr>
-            <a:spLocks noGrp="1"/>
-          </p:cNvSpPr>
-          <p:nvPr>
-            <p:ph type="body" idx="1"/>
-          </p:nvPr>
-        </p:nvSpPr>
-        <p:spPr/>
-        <p:txBody>
-          <a:bodyPr/>
-          <a:lstStyle/>
-          <a:p>
-            <a:r>
-              <a:t>Lorem ipsum dolor sit amet, consectetur adipiscing elit. Fusce diam ipsum, aliquam sit amet tempor sed.</a:t>
+            <p:ph type="ctrTitle"/>
+          </p:nvPr>
+        </p:nvSpPr>
+        <p:spPr/>
+        <p:txBody>
+          <a:bodyPr/>
+          <a:lstStyle/>
+          <a:p>
+            <a:r>
+              <a:t>Document title</a:t>
+            </a:r>
+          </a:p>
+        </p:txBody>
+      </p:sp>
+      <p:sp>
+        <p:nvSpPr>
+          <p:cNvPr id="3" name="Subtitle 2"/>
+          <p:cNvSpPr>
+            <a:spLocks noGrp="1"/>
+          </p:cNvSpPr>
+          <p:nvPr>
+            <p:ph type="subTitle" idx="1"/>
+          </p:nvPr>
+        </p:nvSpPr>
+        <p:spPr/>
+        <p:txBody>
+          <a:bodyPr/>
+          <a:lstStyle/>
+          <a:p>
+            <a:r>
+              <a:t>Lorem ipsum dolor sit amet, consectetur adipiscing elit. Fusce diam ipsum, aliquam sit amet tempor sed, sodales vitae tellus. Fusce vitae lobortis quam. Proin laoreet efficitur ligula, laoreet congue neque condimentum a</a:t>
             </a:r>
           </a:p>
         </p:txBody>
@@ -3231,49 +3459,28 @@
           <a:lstStyle/>
           <a:p>
             <a:r>
-              <a:t>Part 1-1</a:t>
-            </a:r>
-          </a:p>
-        </p:txBody>
-      </p:sp>
-      <p:sp>
-        <p:nvSpPr>
-          <p:cNvPr id="3" name="Content Placeholder 2"/>
-          <p:cNvSpPr>
-            <a:spLocks noGrp="1"/>
-          </p:cNvSpPr>
-          <p:nvPr>
-            <p:ph idx="1" sz="half"/>
-          </p:nvPr>
-        </p:nvSpPr>
-        <p:spPr/>
-        <p:txBody>
-          <a:bodyPr/>
-          <a:lstStyle/>
-          <a:p>
-            <a:r>
-              <a:t>Lorem ipsum dolor sit amet, consectetur adipiscing elit. Fusce diam ipsum, aliquam sit amet tempor sed, sodales vitae tellus.</a:t>
-            </a:r>
-          </a:p>
-        </p:txBody>
-      </p:sp>
-      <p:sp>
-        <p:nvSpPr>
-          <p:cNvPr id="4" name="Content Placeholder 3"/>
-          <p:cNvSpPr>
-            <a:spLocks noGrp="1"/>
-          </p:cNvSpPr>
-          <p:nvPr>
-            <p:ph idx="2" sz="half"/>
-          </p:nvPr>
-        </p:nvSpPr>
-        <p:spPr/>
-        <p:txBody>
-          <a:bodyPr/>
-          <a:lstStyle/>
-          <a:p>
-            <a:r>
-              <a:t>Nulla odio nibh, aliquam sit amet eros a, vehicula eleifend tortor. Sed interdum tellus eu convallis pretium. Proin euismod felis id tortor semper, vel vehicula quam dapibus.</a:t>
+              <a:t>Part 1</a:t>
+            </a:r>
+          </a:p>
+        </p:txBody>
+      </p:sp>
+      <p:sp>
+        <p:nvSpPr>
+          <p:cNvPr id="3" name="Text Placeholder 2"/>
+          <p:cNvSpPr>
+            <a:spLocks noGrp="1"/>
+          </p:cNvSpPr>
+          <p:nvPr>
+            <p:ph type="body" idx="1"/>
+          </p:nvPr>
+        </p:nvSpPr>
+        <p:spPr/>
+        <p:txBody>
+          <a:bodyPr/>
+          <a:lstStyle/>
+          <a:p>
+            <a:r>
+              <a:t>Lorem ipsum dolor sit amet, consectetur adipiscing elit. Fusce diam ipsum, aliquam sit amet tempor sed.</a:t>
             </a:r>
           </a:p>
         </p:txBody>
@@ -3312,7 +3519,7 @@
           <a:lstStyle/>
           <a:p>
             <a:r>
-              <a:t>Part 1-2</a:t>
+              <a:t>Part 1-1</a:t>
             </a:r>
           </a:p>
         </p:txBody>
@@ -3331,11 +3538,7 @@
         <p:txBody>
           <a:bodyPr/>
           <a:lstStyle/>
-          <a:p>
-            <a:r>
-              <a:t>Lorem ipsum dolor sit amet, consectetur adipiscing elit. Fusce diam ipsum, aliquam sit amet tempor sed, sodales vitae tellus.</a:t>
-            </a:r>
-          </a:p>
+          <a:p/>
         </p:txBody>
       </p:sp>
       <p:sp>
@@ -3352,11 +3555,7 @@
         <p:txBody>
           <a:bodyPr/>
           <a:lstStyle/>
-          <a:p>
-            <a:r>
-              <a:t>Nulla odio nibh, aliquam sit amet eros a, vehicula eleifend tortor.</a:t>
-            </a:r>
-          </a:p>
+          <a:p/>
         </p:txBody>
       </p:sp>
     </p:spTree>
@@ -3393,26 +3592,35 @@
           <a:lstStyle/>
           <a:p>
             <a:r>
-              <a:t>Part 2</a:t>
-            </a:r>
-          </a:p>
-        </p:txBody>
-      </p:sp>
-      <p:sp>
-        <p:nvSpPr>
-          <p:cNvPr id="3" name="Text Placeholder 2"/>
-          <p:cNvSpPr>
-            <a:spLocks noGrp="1"/>
-          </p:cNvSpPr>
-          <p:nvPr>
-            <p:ph type="body" idx="1"/>
-          </p:nvPr>
-        </p:nvSpPr>
-        <p:spPr/>
-        <p:txBody>
-          <a:bodyPr/>
-          <a:lstStyle/>
-          <a:p/>
+              <a:t>Part 1-1</a:t>
+            </a:r>
+          </a:p>
+        </p:txBody>
+      </p:sp>
+      <p:sp>
+        <p:nvSpPr>
+          <p:cNvPr id="3" name="Content Placeholder 2"/>
+          <p:cNvSpPr>
+            <a:spLocks noGrp="1"/>
+          </p:cNvSpPr>
+          <p:nvPr>
+            <p:ph idx="1"/>
+          </p:nvPr>
+        </p:nvSpPr>
+        <p:spPr/>
+        <p:txBody>
+          <a:bodyPr/>
+          <a:lstStyle/>
+          <a:p>
+            <a:r>
+              <a:t>Lorem ipsum dolor sit amet, consectetur adipiscing elit. Fusce diam ipsum, aliquam sit amet tempor sed, sodales vitae tellus.</a:t>
+            </a:r>
+          </a:p>
+          <a:p>
+            <a:r>
+              <a:t>Nulla odio nibh, aliquam sit amet eros a, vehicula eleifend tortor. Sed interdum tellus eu convallis pretium. Proin euismod felis id tortor semper, vel vehicula quam dapibus.</a:t>
+            </a:r>
+          </a:p>
         </p:txBody>
       </p:sp>
     </p:spTree>
@@ -3449,7 +3657,7 @@
           <a:lstStyle/>
           <a:p>
             <a:r>
-              <a:t>Part 2-1</a:t>
+              <a:t>Part 1-2</a:t>
             </a:r>
           </a:p>
         </p:txBody>
@@ -3461,18 +3669,31 @@
             <a:spLocks noGrp="1"/>
           </p:cNvSpPr>
           <p:nvPr>
-            <p:ph idx="1"/>
-          </p:nvPr>
-        </p:nvSpPr>
-        <p:spPr/>
-        <p:txBody>
-          <a:bodyPr/>
-          <a:lstStyle/>
-          <a:p>
-            <a:r>
-              <a:t>Lorem ipsum dolor sit amet, consectetur adipiscing elit. Fusce diam ipsum, aliquam sit amet tempor sed, sodales vitae tellus.</a:t>
-            </a:r>
-          </a:p>
+            <p:ph idx="1" sz="half"/>
+          </p:nvPr>
+        </p:nvSpPr>
+        <p:spPr/>
+        <p:txBody>
+          <a:bodyPr/>
+          <a:lstStyle/>
+          <a:p/>
+        </p:txBody>
+      </p:sp>
+      <p:sp>
+        <p:nvSpPr>
+          <p:cNvPr id="4" name="Content Placeholder 3"/>
+          <p:cNvSpPr>
+            <a:spLocks noGrp="1"/>
+          </p:cNvSpPr>
+          <p:nvPr>
+            <p:ph idx="2" sz="half"/>
+          </p:nvPr>
+        </p:nvSpPr>
+        <p:spPr/>
+        <p:txBody>
+          <a:bodyPr/>
+          <a:lstStyle/>
+          <a:p/>
         </p:txBody>
       </p:sp>
     </p:spTree>
@@ -3509,7 +3730,7 @@
           <a:lstStyle/>
           <a:p>
             <a:r>
-              <a:t>Part 2-2</a:t>
+              <a:t>Part 1-2</a:t>
             </a:r>
           </a:p>
         </p:txBody>
@@ -3530,7 +3751,12 @@
           <a:lstStyle/>
           <a:p>
             <a:r>
-              <a:t>Lorem ipsum dolor sit amet, consectetur adipiscing elit. Fusce diam ipsum, aliquam sit amet tempor sed, sodales vitae tellus. Nulla odio nibh, aliquam sit amet eros a, vehicula eleifend tortor.</a:t>
+              <a:t>Lorem ipsum dolor sit amet, consectetur adipiscing elit. Fusce diam ipsum, aliquam sit amet tempor sed, sodales vitae tellus.</a:t>
+            </a:r>
+          </a:p>
+          <a:p>
+            <a:r>
+              <a:t>Nulla odio nibh, aliquam sit amet eros a, vehicula eleifend tortor.</a:t>
             </a:r>
           </a:p>
         </p:txBody>
@@ -3569,7 +3795,63 @@
           <a:lstStyle/>
           <a:p>
             <a:r>
-              <a:t>Part 2-2-1</a:t>
+              <a:t>Part 2</a:t>
+            </a:r>
+          </a:p>
+        </p:txBody>
+      </p:sp>
+      <p:sp>
+        <p:nvSpPr>
+          <p:cNvPr id="3" name="Text Placeholder 2"/>
+          <p:cNvSpPr>
+            <a:spLocks noGrp="1"/>
+          </p:cNvSpPr>
+          <p:nvPr>
+            <p:ph type="body" idx="1"/>
+          </p:nvPr>
+        </p:nvSpPr>
+        <p:spPr/>
+        <p:txBody>
+          <a:bodyPr/>
+          <a:lstStyle/>
+          <a:p/>
+        </p:txBody>
+      </p:sp>
+    </p:spTree>
+  </p:cSld>
+  <p:clrMapOvr>
+    <a:masterClrMapping/>
+  </p:clrMapOvr>
+</p:sld>
+</file>
+
+<file path=ppt/slides/slide9.xml><?xml version="1.0" encoding="utf-8"?>
+<p:sld xmlns:a="http://schemas.openxmlformats.org/drawingml/2006/main" xmlns:p="http://schemas.openxmlformats.org/presentationml/2006/main" xmlns:r="http://schemas.openxmlformats.org/officeDocument/2006/relationships">
+  <p:cSld>
+    <p:spTree>
+      <p:nvGrpSpPr>
+        <p:cNvPr id="1" name=""/>
+        <p:cNvGrpSpPr/>
+        <p:nvPr/>
+      </p:nvGrpSpPr>
+      <p:grpSpPr/>
+      <p:sp>
+        <p:nvSpPr>
+          <p:cNvPr id="2" name="Title 1"/>
+          <p:cNvSpPr>
+            <a:spLocks noGrp="1"/>
+          </p:cNvSpPr>
+          <p:nvPr>
+            <p:ph type="title"/>
+          </p:nvPr>
+        </p:nvSpPr>
+        <p:spPr/>
+        <p:txBody>
+          <a:bodyPr/>
+          <a:lstStyle/>
+          <a:p>
+            <a:r>
+              <a:t>Part 2-1</a:t>
             </a:r>
           </a:p>
         </p:txBody>
@@ -3581,37 +3863,16 @@
             <a:spLocks noGrp="1"/>
           </p:cNvSpPr>
           <p:nvPr>
-            <p:ph idx="1" sz="half"/>
-          </p:nvPr>
-        </p:nvSpPr>
-        <p:spPr/>
-        <p:txBody>
-          <a:bodyPr/>
-          <a:lstStyle/>
-          <a:p>
-            <a:r>
-              <a:t>Lorem ipsum dolor sit amet, consectetur adipiscing elit.</a:t>
-            </a:r>
-          </a:p>
-        </p:txBody>
-      </p:sp>
-      <p:sp>
-        <p:nvSpPr>
-          <p:cNvPr id="4" name="Content Placeholder 3"/>
-          <p:cNvSpPr>
-            <a:spLocks noGrp="1"/>
-          </p:cNvSpPr>
-          <p:nvPr>
-            <p:ph idx="2" sz="half"/>
-          </p:nvPr>
-        </p:nvSpPr>
-        <p:spPr/>
-        <p:txBody>
-          <a:bodyPr/>
-          <a:lstStyle/>
-          <a:p>
-            <a:r>
-              <a:t>Deuxieme texte</a:t>
+            <p:ph idx="1"/>
+          </p:nvPr>
+        </p:nvSpPr>
+        <p:spPr/>
+        <p:txBody>
+          <a:bodyPr/>
+          <a:lstStyle/>
+          <a:p>
+            <a:r>
+              <a:t>Lorem ipsum dolor sit amet, consectetur adipiscing elit. Fusce diam ipsum, aliquam sit amet tempor sed, sodales vitae tellus.</a:t>
             </a:r>
           </a:p>
         </p:txBody>

</xml_diff>